<commit_message>
GLBio after first revision
</commit_message>
<xml_diff>
--- a/GLBio.pptx
+++ b/GLBio.pptx
@@ -2863,6 +2863,13 @@
         </dgm:presLayoutVars>
       </dgm:prSet>
       <dgm:spPr/>
+      <dgm:t>
+        <a:bodyPr/>
+        <a:lstStyle/>
+        <a:p>
+          <a:endParaRPr lang="en-US"/>
+        </a:p>
+      </dgm:t>
     </dgm:pt>
     <dgm:pt modelId="{75223CAA-7D95-994F-B73B-F70557FE184F}" type="pres">
       <dgm:prSet presAssocID="{1D7CD905-2134-6941-A180-A2BCB496725F}" presName="root" presStyleCnt="0"/>
@@ -2886,6 +2893,13 @@
     <dgm:pt modelId="{A695A6EF-A296-A34B-A258-85D65B49F9D0}" type="pres">
       <dgm:prSet presAssocID="{1D7CD905-2134-6941-A180-A2BCB496725F}" presName="rootConnector" presStyleLbl="node1" presStyleIdx="0" presStyleCnt="3"/>
       <dgm:spPr/>
+      <dgm:t>
+        <a:bodyPr/>
+        <a:lstStyle/>
+        <a:p>
+          <a:endParaRPr lang="en-US"/>
+        </a:p>
+      </dgm:t>
     </dgm:pt>
     <dgm:pt modelId="{15B2AC8C-C6BE-1C4B-9872-4F0736A91AA6}" type="pres">
       <dgm:prSet presAssocID="{1D7CD905-2134-6941-A180-A2BCB496725F}" presName="childShape" presStyleCnt="0"/>
@@ -2894,6 +2908,13 @@
     <dgm:pt modelId="{4E27BDE8-9068-5348-AC30-BB4A3847DDFD}" type="pres">
       <dgm:prSet presAssocID="{AC2E504E-0923-D44B-ABCD-70607D794270}" presName="Name13" presStyleLbl="parChTrans1D2" presStyleIdx="0" presStyleCnt="9"/>
       <dgm:spPr/>
+      <dgm:t>
+        <a:bodyPr/>
+        <a:lstStyle/>
+        <a:p>
+          <a:endParaRPr lang="en-US"/>
+        </a:p>
+      </dgm:t>
     </dgm:pt>
     <dgm:pt modelId="{12DA5909-ADFB-2A40-A699-E7E8B523FCEB}" type="pres">
       <dgm:prSet presAssocID="{8415D8C8-36C5-6044-BB1D-9FC1A628B0EC}" presName="childText" presStyleLbl="bgAcc1" presStyleIdx="0" presStyleCnt="9">
@@ -2913,6 +2934,13 @@
     <dgm:pt modelId="{0C3F763D-8E11-F34D-810D-888D3FC54C11}" type="pres">
       <dgm:prSet presAssocID="{372A6B95-D9E5-6249-B2F0-0DE6F6192180}" presName="Name13" presStyleLbl="parChTrans1D2" presStyleIdx="1" presStyleCnt="9"/>
       <dgm:spPr/>
+      <dgm:t>
+        <a:bodyPr/>
+        <a:lstStyle/>
+        <a:p>
+          <a:endParaRPr lang="en-US"/>
+        </a:p>
+      </dgm:t>
     </dgm:pt>
     <dgm:pt modelId="{94E73A5D-50EB-DF44-A6CB-2FC0FE1DB175}" type="pres">
       <dgm:prSet presAssocID="{282EB197-92B1-0F4D-A132-91EB58EF79F8}" presName="childText" presStyleLbl="bgAcc1" presStyleIdx="1" presStyleCnt="9">
@@ -2932,6 +2960,13 @@
     <dgm:pt modelId="{0C95946C-2ADA-4540-AF70-7F8DF22B65AC}" type="pres">
       <dgm:prSet presAssocID="{AF2337E9-20E5-D34E-B312-1E09EE352563}" presName="Name13" presStyleLbl="parChTrans1D2" presStyleIdx="2" presStyleCnt="9"/>
       <dgm:spPr/>
+      <dgm:t>
+        <a:bodyPr/>
+        <a:lstStyle/>
+        <a:p>
+          <a:endParaRPr lang="en-US"/>
+        </a:p>
+      </dgm:t>
     </dgm:pt>
     <dgm:pt modelId="{4195EDD7-3FC5-C849-90D8-9A4C827BEF82}" type="pres">
       <dgm:prSet presAssocID="{62872CB7-6208-5940-B7FF-EEC60552E903}" presName="childText" presStyleLbl="bgAcc1" presStyleIdx="2" presStyleCnt="9">
@@ -2959,10 +2994,24 @@
     <dgm:pt modelId="{253C3E27-8461-0B45-8874-BEF1D44C5918}" type="pres">
       <dgm:prSet presAssocID="{B86E826E-A4B7-9F49-B6D9-1E7B93ABC95A}" presName="rootText" presStyleLbl="node1" presStyleIdx="1" presStyleCnt="3"/>
       <dgm:spPr/>
+      <dgm:t>
+        <a:bodyPr/>
+        <a:lstStyle/>
+        <a:p>
+          <a:endParaRPr lang="en-US"/>
+        </a:p>
+      </dgm:t>
     </dgm:pt>
     <dgm:pt modelId="{53BF9510-9AD4-C04B-A308-17583C7F206C}" type="pres">
       <dgm:prSet presAssocID="{B86E826E-A4B7-9F49-B6D9-1E7B93ABC95A}" presName="rootConnector" presStyleLbl="node1" presStyleIdx="1" presStyleCnt="3"/>
       <dgm:spPr/>
+      <dgm:t>
+        <a:bodyPr/>
+        <a:lstStyle/>
+        <a:p>
+          <a:endParaRPr lang="en-US"/>
+        </a:p>
+      </dgm:t>
     </dgm:pt>
     <dgm:pt modelId="{B926A83E-C152-6144-9B20-FBB14405E9C8}" type="pres">
       <dgm:prSet presAssocID="{B86E826E-A4B7-9F49-B6D9-1E7B93ABC95A}" presName="childShape" presStyleCnt="0"/>
@@ -2971,6 +3020,13 @@
     <dgm:pt modelId="{E10FB654-E92F-E246-9EBC-458638B895DC}" type="pres">
       <dgm:prSet presAssocID="{14CE5FA8-1A58-B747-A61A-E67702DE3F98}" presName="Name13" presStyleLbl="parChTrans1D2" presStyleIdx="3" presStyleCnt="9"/>
       <dgm:spPr/>
+      <dgm:t>
+        <a:bodyPr/>
+        <a:lstStyle/>
+        <a:p>
+          <a:endParaRPr lang="en-US"/>
+        </a:p>
+      </dgm:t>
     </dgm:pt>
     <dgm:pt modelId="{3AAF3E1E-DE9F-B14D-A0F1-66919A908185}" type="pres">
       <dgm:prSet presAssocID="{43E719E6-E2A7-3945-8C6B-84966B025640}" presName="childText" presStyleLbl="bgAcc1" presStyleIdx="3" presStyleCnt="9">
@@ -2990,6 +3046,13 @@
     <dgm:pt modelId="{7191EAC8-EDA2-C34E-984C-C06477817B58}" type="pres">
       <dgm:prSet presAssocID="{4BB91865-2893-1D40-8B9D-F43A2C5779EE}" presName="Name13" presStyleLbl="parChTrans1D2" presStyleIdx="4" presStyleCnt="9"/>
       <dgm:spPr/>
+      <dgm:t>
+        <a:bodyPr/>
+        <a:lstStyle/>
+        <a:p>
+          <a:endParaRPr lang="en-US"/>
+        </a:p>
+      </dgm:t>
     </dgm:pt>
     <dgm:pt modelId="{DB2F40E0-9FD7-624D-950A-542C717B0F6C}" type="pres">
       <dgm:prSet presAssocID="{6F176830-7940-A84B-8A6C-398B6601EB2F}" presName="childText" presStyleLbl="bgAcc1" presStyleIdx="4" presStyleCnt="9">
@@ -3009,6 +3072,13 @@
     <dgm:pt modelId="{1847AB1E-3E0E-5D47-BBAB-B1B62A873B3A}" type="pres">
       <dgm:prSet presAssocID="{CBF7C50D-8310-AC4C-BB74-7BE8C6959265}" presName="Name13" presStyleLbl="parChTrans1D2" presStyleIdx="5" presStyleCnt="9"/>
       <dgm:spPr/>
+      <dgm:t>
+        <a:bodyPr/>
+        <a:lstStyle/>
+        <a:p>
+          <a:endParaRPr lang="en-US"/>
+        </a:p>
+      </dgm:t>
     </dgm:pt>
     <dgm:pt modelId="{D80CB533-8233-EE44-BADE-3401C3F4A159}" type="pres">
       <dgm:prSet presAssocID="{0D5B4EFC-13EB-7C40-A9CF-27AA28C7BE52}" presName="childText" presStyleLbl="bgAcc1" presStyleIdx="5" presStyleCnt="9">
@@ -3047,6 +3117,13 @@
     <dgm:pt modelId="{0EE01224-0C37-4A44-A80B-7346B2402C9A}" type="pres">
       <dgm:prSet presAssocID="{0A4FAA92-892E-DF40-B8E5-6552AA3219AB}" presName="rootConnector" presStyleLbl="node1" presStyleIdx="2" presStyleCnt="3"/>
       <dgm:spPr/>
+      <dgm:t>
+        <a:bodyPr/>
+        <a:lstStyle/>
+        <a:p>
+          <a:endParaRPr lang="en-US"/>
+        </a:p>
+      </dgm:t>
     </dgm:pt>
     <dgm:pt modelId="{9A4B2E14-F961-9D48-B05A-818C5E2F0356}" type="pres">
       <dgm:prSet presAssocID="{0A4FAA92-892E-DF40-B8E5-6552AA3219AB}" presName="childShape" presStyleCnt="0"/>
@@ -3055,6 +3132,13 @@
     <dgm:pt modelId="{33C83B67-DA71-114F-850F-75BF3F425167}" type="pres">
       <dgm:prSet presAssocID="{80F0DC80-F3BF-BC48-9A45-9EB31247C651}" presName="Name13" presStyleLbl="parChTrans1D2" presStyleIdx="6" presStyleCnt="9"/>
       <dgm:spPr/>
+      <dgm:t>
+        <a:bodyPr/>
+        <a:lstStyle/>
+        <a:p>
+          <a:endParaRPr lang="en-US"/>
+        </a:p>
+      </dgm:t>
     </dgm:pt>
     <dgm:pt modelId="{E91D6E98-4A8A-7D4B-831B-515ED221AB5A}" type="pres">
       <dgm:prSet presAssocID="{2C7F63FC-6D48-F241-BE8F-7796AA3A8831}" presName="childText" presStyleLbl="bgAcc1" presStyleIdx="6" presStyleCnt="9">
@@ -3074,6 +3158,13 @@
     <dgm:pt modelId="{963A8818-EFB5-2045-8E97-06864C5E1E48}" type="pres">
       <dgm:prSet presAssocID="{D832FB61-F5A1-744B-B77F-8B55494B5920}" presName="Name13" presStyleLbl="parChTrans1D2" presStyleIdx="7" presStyleCnt="9"/>
       <dgm:spPr/>
+      <dgm:t>
+        <a:bodyPr/>
+        <a:lstStyle/>
+        <a:p>
+          <a:endParaRPr lang="en-US"/>
+        </a:p>
+      </dgm:t>
     </dgm:pt>
     <dgm:pt modelId="{586242FA-5624-2C40-9C92-DF6EFC47163A}" type="pres">
       <dgm:prSet presAssocID="{091B6FCD-29FB-0E4D-9D26-986120DFA0DD}" presName="childText" presStyleLbl="bgAcc1" presStyleIdx="7" presStyleCnt="9">
@@ -3093,6 +3184,13 @@
     <dgm:pt modelId="{E23DDC20-F7CF-5E4C-B8D9-56BD62DBDC5A}" type="pres">
       <dgm:prSet presAssocID="{3E34CCC3-1E18-8444-96D2-32DE8FE85E9F}" presName="Name13" presStyleLbl="parChTrans1D2" presStyleIdx="8" presStyleCnt="9"/>
       <dgm:spPr/>
+      <dgm:t>
+        <a:bodyPr/>
+        <a:lstStyle/>
+        <a:p>
+          <a:endParaRPr lang="en-US"/>
+        </a:p>
+      </dgm:t>
     </dgm:pt>
     <dgm:pt modelId="{53E2407D-CFE3-8647-98CE-0D339859E4F2}" type="pres">
       <dgm:prSet presAssocID="{B7CEE7F7-D996-E649-BBF4-D184B1373D29}" presName="childText" presStyleLbl="bgAcc1" presStyleIdx="8" presStyleCnt="9">
@@ -3111,43 +3209,43 @@
     </dgm:pt>
   </dgm:ptLst>
   <dgm:cxnLst>
+    <dgm:cxn modelId="{918B2973-68A1-1D49-BDA9-D14438D16B28}" srcId="{B86E826E-A4B7-9F49-B6D9-1E7B93ABC95A}" destId="{0D5B4EFC-13EB-7C40-A9CF-27AA28C7BE52}" srcOrd="2" destOrd="0" parTransId="{CBF7C50D-8310-AC4C-BB74-7BE8C6959265}" sibTransId="{92B75DEF-9404-3B42-A557-0015D5EE6CA2}"/>
+    <dgm:cxn modelId="{33D3A47B-6FF5-C549-8B4C-E4A4BAC2514F}" srcId="{0A4FAA92-892E-DF40-B8E5-6552AA3219AB}" destId="{091B6FCD-29FB-0E4D-9D26-986120DFA0DD}" srcOrd="1" destOrd="0" parTransId="{D832FB61-F5A1-744B-B77F-8B55494B5920}" sibTransId="{13D5E70B-238C-184D-BE60-15038BC76481}"/>
     <dgm:cxn modelId="{59A983C9-B5C8-5A4E-ADF7-7AFD775D5526}" type="presOf" srcId="{43E719E6-E2A7-3945-8C6B-84966B025640}" destId="{3AAF3E1E-DE9F-B14D-A0F1-66919A908185}" srcOrd="0" destOrd="0" presId="urn:microsoft.com/office/officeart/2005/8/layout/hierarchy3"/>
-    <dgm:cxn modelId="{33D3A47B-6FF5-C549-8B4C-E4A4BAC2514F}" srcId="{0A4FAA92-892E-DF40-B8E5-6552AA3219AB}" destId="{091B6FCD-29FB-0E4D-9D26-986120DFA0DD}" srcOrd="1" destOrd="0" parTransId="{D832FB61-F5A1-744B-B77F-8B55494B5920}" sibTransId="{13D5E70B-238C-184D-BE60-15038BC76481}"/>
+    <dgm:cxn modelId="{3A61DC4F-DAED-1C44-A37D-E6F37F4C475E}" type="presOf" srcId="{AF2337E9-20E5-D34E-B312-1E09EE352563}" destId="{0C95946C-2ADA-4540-AF70-7F8DF22B65AC}" srcOrd="0" destOrd="0" presId="urn:microsoft.com/office/officeart/2005/8/layout/hierarchy3"/>
+    <dgm:cxn modelId="{1D18B38E-3CBB-304D-A3BA-0716145F7F97}" type="presOf" srcId="{4BB91865-2893-1D40-8B9D-F43A2C5779EE}" destId="{7191EAC8-EDA2-C34E-984C-C06477817B58}" srcOrd="0" destOrd="0" presId="urn:microsoft.com/office/officeart/2005/8/layout/hierarchy3"/>
+    <dgm:cxn modelId="{93FFDB80-91DF-2449-AE8A-897EDB2C79F3}" srcId="{0A4FAA92-892E-DF40-B8E5-6552AA3219AB}" destId="{B7CEE7F7-D996-E649-BBF4-D184B1373D29}" srcOrd="2" destOrd="0" parTransId="{3E34CCC3-1E18-8444-96D2-32DE8FE85E9F}" sibTransId="{01AFFD22-759D-A143-89E4-47A9A56362E6}"/>
+    <dgm:cxn modelId="{0B67654B-DFDB-4F43-A320-D13497D59663}" type="presOf" srcId="{EE7ED4A5-36A2-D342-9D65-825850484F33}" destId="{5C2F9454-BA97-AE44-8FE8-AD4764E0C8E4}" srcOrd="0" destOrd="0" presId="urn:microsoft.com/office/officeart/2005/8/layout/hierarchy3"/>
+    <dgm:cxn modelId="{42695AED-DA5F-6245-914E-9289C0DDF05C}" type="presOf" srcId="{D832FB61-F5A1-744B-B77F-8B55494B5920}" destId="{963A8818-EFB5-2045-8E97-06864C5E1E48}" srcOrd="0" destOrd="0" presId="urn:microsoft.com/office/officeart/2005/8/layout/hierarchy3"/>
+    <dgm:cxn modelId="{0F13D986-AF0C-C447-BF2F-A66201A3E499}" type="presOf" srcId="{62872CB7-6208-5940-B7FF-EEC60552E903}" destId="{4195EDD7-3FC5-C849-90D8-9A4C827BEF82}" srcOrd="0" destOrd="0" presId="urn:microsoft.com/office/officeart/2005/8/layout/hierarchy3"/>
+    <dgm:cxn modelId="{C8BE8AC0-B677-414A-B60E-955BEB17E324}" srcId="{B86E826E-A4B7-9F49-B6D9-1E7B93ABC95A}" destId="{6F176830-7940-A84B-8A6C-398B6601EB2F}" srcOrd="1" destOrd="0" parTransId="{4BB91865-2893-1D40-8B9D-F43A2C5779EE}" sibTransId="{39279495-4387-F24A-9A87-9032EA9E534F}"/>
+    <dgm:cxn modelId="{4B4FF22F-381E-3F4D-88F9-475C2DC53B19}" srcId="{1D7CD905-2134-6941-A180-A2BCB496725F}" destId="{8415D8C8-36C5-6044-BB1D-9FC1A628B0EC}" srcOrd="0" destOrd="0" parTransId="{AC2E504E-0923-D44B-ABCD-70607D794270}" sibTransId="{D8C7C9FF-1AF0-FA45-9CA3-07D54C918F56}"/>
+    <dgm:cxn modelId="{0614B6E3-4F51-874C-8185-028725A657EA}" type="presOf" srcId="{0A4FAA92-892E-DF40-B8E5-6552AA3219AB}" destId="{0EE01224-0C37-4A44-A80B-7346B2402C9A}" srcOrd="1" destOrd="0" presId="urn:microsoft.com/office/officeart/2005/8/layout/hierarchy3"/>
+    <dgm:cxn modelId="{B17DA013-0FB2-4B4C-9D87-DD523E3940E6}" type="presOf" srcId="{1D7CD905-2134-6941-A180-A2BCB496725F}" destId="{A695A6EF-A296-A34B-A258-85D65B49F9D0}" srcOrd="1" destOrd="0" presId="urn:microsoft.com/office/officeart/2005/8/layout/hierarchy3"/>
     <dgm:cxn modelId="{771AB458-1F38-EA49-B4DC-E036AAE1E602}" type="presOf" srcId="{0A4FAA92-892E-DF40-B8E5-6552AA3219AB}" destId="{2BF9052C-BCA7-FC4E-B1EB-96B51D0EB83D}" srcOrd="0" destOrd="0" presId="urn:microsoft.com/office/officeart/2005/8/layout/hierarchy3"/>
-    <dgm:cxn modelId="{3A61DC4F-DAED-1C44-A37D-E6F37F4C475E}" type="presOf" srcId="{AF2337E9-20E5-D34E-B312-1E09EE352563}" destId="{0C95946C-2ADA-4540-AF70-7F8DF22B65AC}" srcOrd="0" destOrd="0" presId="urn:microsoft.com/office/officeart/2005/8/layout/hierarchy3"/>
+    <dgm:cxn modelId="{740AB78C-EFB5-8E4F-9943-46265A83F0F8}" type="presOf" srcId="{372A6B95-D9E5-6249-B2F0-0DE6F6192180}" destId="{0C3F763D-8E11-F34D-810D-888D3FC54C11}" srcOrd="0" destOrd="0" presId="urn:microsoft.com/office/officeart/2005/8/layout/hierarchy3"/>
+    <dgm:cxn modelId="{0FCB3137-1BE7-9D4C-8D84-D274B0269F6A}" type="presOf" srcId="{B86E826E-A4B7-9F49-B6D9-1E7B93ABC95A}" destId="{253C3E27-8461-0B45-8874-BEF1D44C5918}" srcOrd="0" destOrd="0" presId="urn:microsoft.com/office/officeart/2005/8/layout/hierarchy3"/>
+    <dgm:cxn modelId="{97B904FC-B1EC-1E4D-98BC-8B472ACDED1A}" type="presOf" srcId="{282EB197-92B1-0F4D-A132-91EB58EF79F8}" destId="{94E73A5D-50EB-DF44-A6CB-2FC0FE1DB175}" srcOrd="0" destOrd="0" presId="urn:microsoft.com/office/officeart/2005/8/layout/hierarchy3"/>
+    <dgm:cxn modelId="{6CD6AAAF-A8E8-E345-B33F-05CDE049A4E4}" type="presOf" srcId="{B7CEE7F7-D996-E649-BBF4-D184B1373D29}" destId="{53E2407D-CFE3-8647-98CE-0D339859E4F2}" srcOrd="0" destOrd="0" presId="urn:microsoft.com/office/officeart/2005/8/layout/hierarchy3"/>
+    <dgm:cxn modelId="{BD8EFEC3-A0E6-264D-8381-C3398BE1BE36}" type="presOf" srcId="{AC2E504E-0923-D44B-ABCD-70607D794270}" destId="{4E27BDE8-9068-5348-AC30-BB4A3847DDFD}" srcOrd="0" destOrd="0" presId="urn:microsoft.com/office/officeart/2005/8/layout/hierarchy3"/>
+    <dgm:cxn modelId="{9A49DABF-A1DE-E34D-BC5F-BAC5ED990A31}" srcId="{EE7ED4A5-36A2-D342-9D65-825850484F33}" destId="{B86E826E-A4B7-9F49-B6D9-1E7B93ABC95A}" srcOrd="1" destOrd="0" parTransId="{941F545E-2AAD-CD45-8A4F-496EDE2965E7}" sibTransId="{2771CDD1-8E33-4F49-BFAF-DC39D37E2ECF}"/>
+    <dgm:cxn modelId="{F119EB64-1DFC-3A40-A799-F474B412D2BE}" srcId="{B86E826E-A4B7-9F49-B6D9-1E7B93ABC95A}" destId="{43E719E6-E2A7-3945-8C6B-84966B025640}" srcOrd="0" destOrd="0" parTransId="{14CE5FA8-1A58-B747-A61A-E67702DE3F98}" sibTransId="{66E109A5-C37A-6D40-A59A-DD484DF29F84}"/>
+    <dgm:cxn modelId="{83AD0449-9CC2-B048-BDC2-AFB873BB1426}" type="presOf" srcId="{0D5B4EFC-13EB-7C40-A9CF-27AA28C7BE52}" destId="{D80CB533-8233-EE44-BADE-3401C3F4A159}" srcOrd="0" destOrd="0" presId="urn:microsoft.com/office/officeart/2005/8/layout/hierarchy3"/>
+    <dgm:cxn modelId="{89A1AAAF-5E26-3E47-BD2C-3F13D58F7940}" type="presOf" srcId="{091B6FCD-29FB-0E4D-9D26-986120DFA0DD}" destId="{586242FA-5624-2C40-9C92-DF6EFC47163A}" srcOrd="0" destOrd="0" presId="urn:microsoft.com/office/officeart/2005/8/layout/hierarchy3"/>
     <dgm:cxn modelId="{964AF449-5953-7740-90C2-7FDC364C8205}" srcId="{0A4FAA92-892E-DF40-B8E5-6552AA3219AB}" destId="{2C7F63FC-6D48-F241-BE8F-7796AA3A8831}" srcOrd="0" destOrd="0" parTransId="{80F0DC80-F3BF-BC48-9A45-9EB31247C651}" sibTransId="{36A462A4-26E4-0343-9F3F-0D55221C8DD2}"/>
-    <dgm:cxn modelId="{9A49DABF-A1DE-E34D-BC5F-BAC5ED990A31}" srcId="{EE7ED4A5-36A2-D342-9D65-825850484F33}" destId="{B86E826E-A4B7-9F49-B6D9-1E7B93ABC95A}" srcOrd="1" destOrd="0" parTransId="{941F545E-2AAD-CD45-8A4F-496EDE2965E7}" sibTransId="{2771CDD1-8E33-4F49-BFAF-DC39D37E2ECF}"/>
-    <dgm:cxn modelId="{1D18B38E-3CBB-304D-A3BA-0716145F7F97}" type="presOf" srcId="{4BB91865-2893-1D40-8B9D-F43A2C5779EE}" destId="{7191EAC8-EDA2-C34E-984C-C06477817B58}" srcOrd="0" destOrd="0" presId="urn:microsoft.com/office/officeart/2005/8/layout/hierarchy3"/>
-    <dgm:cxn modelId="{83AD0449-9CC2-B048-BDC2-AFB873BB1426}" type="presOf" srcId="{0D5B4EFC-13EB-7C40-A9CF-27AA28C7BE52}" destId="{D80CB533-8233-EE44-BADE-3401C3F4A159}" srcOrd="0" destOrd="0" presId="urn:microsoft.com/office/officeart/2005/8/layout/hierarchy3"/>
+    <dgm:cxn modelId="{28E779EC-DBFF-9440-93F5-BDBE85652C7D}" type="presOf" srcId="{14CE5FA8-1A58-B747-A61A-E67702DE3F98}" destId="{E10FB654-E92F-E246-9EBC-458638B895DC}" srcOrd="0" destOrd="0" presId="urn:microsoft.com/office/officeart/2005/8/layout/hierarchy3"/>
+    <dgm:cxn modelId="{24B5C9CF-59AB-B247-AB33-7C8AF410CBE8}" srcId="{EE7ED4A5-36A2-D342-9D65-825850484F33}" destId="{1D7CD905-2134-6941-A180-A2BCB496725F}" srcOrd="0" destOrd="0" parTransId="{D1AE0821-4B76-F847-BCDB-52B9B1022FCE}" sibTransId="{67256778-18EB-1847-B224-F8FE0334E6B4}"/>
+    <dgm:cxn modelId="{3B11B0F1-73DF-4841-B3D2-4024C7F6C01F}" srcId="{1D7CD905-2134-6941-A180-A2BCB496725F}" destId="{62872CB7-6208-5940-B7FF-EEC60552E903}" srcOrd="2" destOrd="0" parTransId="{AF2337E9-20E5-D34E-B312-1E09EE352563}" sibTransId="{F3CF04AF-1DB4-524D-B29D-8C1B96295F2E}"/>
+    <dgm:cxn modelId="{0C9269B9-013A-F844-B7A9-27B07E7A6F10}" srcId="{1D7CD905-2134-6941-A180-A2BCB496725F}" destId="{282EB197-92B1-0F4D-A132-91EB58EF79F8}" srcOrd="1" destOrd="0" parTransId="{372A6B95-D9E5-6249-B2F0-0DE6F6192180}" sibTransId="{B48D90CA-52AB-DD49-AD09-C1C4B352D655}"/>
+    <dgm:cxn modelId="{D02BC8DA-B75F-5D44-BC82-904A971FD5C1}" type="presOf" srcId="{8415D8C8-36C5-6044-BB1D-9FC1A628B0EC}" destId="{12DA5909-ADFB-2A40-A699-E7E8B523FCEB}" srcOrd="0" destOrd="0" presId="urn:microsoft.com/office/officeart/2005/8/layout/hierarchy3"/>
+    <dgm:cxn modelId="{51A87FD3-AD17-E344-A98D-8814078158B2}" type="presOf" srcId="{1D7CD905-2134-6941-A180-A2BCB496725F}" destId="{38FA3025-FC70-C34F-BD6C-B2BD59D87B83}" srcOrd="0" destOrd="0" presId="urn:microsoft.com/office/officeart/2005/8/layout/hierarchy3"/>
     <dgm:cxn modelId="{B072B382-8760-9E44-BDC6-1DCE35F7DEA0}" srcId="{EE7ED4A5-36A2-D342-9D65-825850484F33}" destId="{0A4FAA92-892E-DF40-B8E5-6552AA3219AB}" srcOrd="2" destOrd="0" parTransId="{D5AA9557-0B4D-5E4E-BF17-53B01F1291F9}" sibTransId="{9CF828AF-7954-CF44-95C2-A6375E8FC9C4}"/>
-    <dgm:cxn modelId="{BD8EFEC3-A0E6-264D-8381-C3398BE1BE36}" type="presOf" srcId="{AC2E504E-0923-D44B-ABCD-70607D794270}" destId="{4E27BDE8-9068-5348-AC30-BB4A3847DDFD}" srcOrd="0" destOrd="0" presId="urn:microsoft.com/office/officeart/2005/8/layout/hierarchy3"/>
-    <dgm:cxn modelId="{918B2973-68A1-1D49-BDA9-D14438D16B28}" srcId="{B86E826E-A4B7-9F49-B6D9-1E7B93ABC95A}" destId="{0D5B4EFC-13EB-7C40-A9CF-27AA28C7BE52}" srcOrd="2" destOrd="0" parTransId="{CBF7C50D-8310-AC4C-BB74-7BE8C6959265}" sibTransId="{92B75DEF-9404-3B42-A557-0015D5EE6CA2}"/>
-    <dgm:cxn modelId="{28E779EC-DBFF-9440-93F5-BDBE85652C7D}" type="presOf" srcId="{14CE5FA8-1A58-B747-A61A-E67702DE3F98}" destId="{E10FB654-E92F-E246-9EBC-458638B895DC}" srcOrd="0" destOrd="0" presId="urn:microsoft.com/office/officeart/2005/8/layout/hierarchy3"/>
+    <dgm:cxn modelId="{AA34D692-7115-3448-B53A-50271E369435}" type="presOf" srcId="{B86E826E-A4B7-9F49-B6D9-1E7B93ABC95A}" destId="{53BF9510-9AD4-C04B-A308-17583C7F206C}" srcOrd="1" destOrd="0" presId="urn:microsoft.com/office/officeart/2005/8/layout/hierarchy3"/>
     <dgm:cxn modelId="{0A86F497-9AF6-764F-B7B7-25C337B87EAB}" type="presOf" srcId="{CBF7C50D-8310-AC4C-BB74-7BE8C6959265}" destId="{1847AB1E-3E0E-5D47-BBAB-B1B62A873B3A}" srcOrd="0" destOrd="0" presId="urn:microsoft.com/office/officeart/2005/8/layout/hierarchy3"/>
-    <dgm:cxn modelId="{F119EB64-1DFC-3A40-A799-F474B412D2BE}" srcId="{B86E826E-A4B7-9F49-B6D9-1E7B93ABC95A}" destId="{43E719E6-E2A7-3945-8C6B-84966B025640}" srcOrd="0" destOrd="0" parTransId="{14CE5FA8-1A58-B747-A61A-E67702DE3F98}" sibTransId="{66E109A5-C37A-6D40-A59A-DD484DF29F84}"/>
-    <dgm:cxn modelId="{B17DA013-0FB2-4B4C-9D87-DD523E3940E6}" type="presOf" srcId="{1D7CD905-2134-6941-A180-A2BCB496725F}" destId="{A695A6EF-A296-A34B-A258-85D65B49F9D0}" srcOrd="1" destOrd="0" presId="urn:microsoft.com/office/officeart/2005/8/layout/hierarchy3"/>
-    <dgm:cxn modelId="{93FFDB80-91DF-2449-AE8A-897EDB2C79F3}" srcId="{0A4FAA92-892E-DF40-B8E5-6552AA3219AB}" destId="{B7CEE7F7-D996-E649-BBF4-D184B1373D29}" srcOrd="2" destOrd="0" parTransId="{3E34CCC3-1E18-8444-96D2-32DE8FE85E9F}" sibTransId="{01AFFD22-759D-A143-89E4-47A9A56362E6}"/>
-    <dgm:cxn modelId="{AA34D692-7115-3448-B53A-50271E369435}" type="presOf" srcId="{B86E826E-A4B7-9F49-B6D9-1E7B93ABC95A}" destId="{53BF9510-9AD4-C04B-A308-17583C7F206C}" srcOrd="1" destOrd="0" presId="urn:microsoft.com/office/officeart/2005/8/layout/hierarchy3"/>
-    <dgm:cxn modelId="{C8BE8AC0-B677-414A-B60E-955BEB17E324}" srcId="{B86E826E-A4B7-9F49-B6D9-1E7B93ABC95A}" destId="{6F176830-7940-A84B-8A6C-398B6601EB2F}" srcOrd="1" destOrd="0" parTransId="{4BB91865-2893-1D40-8B9D-F43A2C5779EE}" sibTransId="{39279495-4387-F24A-9A87-9032EA9E534F}"/>
-    <dgm:cxn modelId="{0FCB3137-1BE7-9D4C-8D84-D274B0269F6A}" type="presOf" srcId="{B86E826E-A4B7-9F49-B6D9-1E7B93ABC95A}" destId="{253C3E27-8461-0B45-8874-BEF1D44C5918}" srcOrd="0" destOrd="0" presId="urn:microsoft.com/office/officeart/2005/8/layout/hierarchy3"/>
+    <dgm:cxn modelId="{4E06CB71-F129-E640-9945-FDDCE7AF9C05}" type="presOf" srcId="{2C7F63FC-6D48-F241-BE8F-7796AA3A8831}" destId="{E91D6E98-4A8A-7D4B-831B-515ED221AB5A}" srcOrd="0" destOrd="0" presId="urn:microsoft.com/office/officeart/2005/8/layout/hierarchy3"/>
     <dgm:cxn modelId="{4B877C9C-65F3-B64A-B8BD-C239FD0BBBA4}" type="presOf" srcId="{3E34CCC3-1E18-8444-96D2-32DE8FE85E9F}" destId="{E23DDC20-F7CF-5E4C-B8D9-56BD62DBDC5A}" srcOrd="0" destOrd="0" presId="urn:microsoft.com/office/officeart/2005/8/layout/hierarchy3"/>
-    <dgm:cxn modelId="{24B5C9CF-59AB-B247-AB33-7C8AF410CBE8}" srcId="{EE7ED4A5-36A2-D342-9D65-825850484F33}" destId="{1D7CD905-2134-6941-A180-A2BCB496725F}" srcOrd="0" destOrd="0" parTransId="{D1AE0821-4B76-F847-BCDB-52B9B1022FCE}" sibTransId="{67256778-18EB-1847-B224-F8FE0334E6B4}"/>
-    <dgm:cxn modelId="{4B4FF22F-381E-3F4D-88F9-475C2DC53B19}" srcId="{1D7CD905-2134-6941-A180-A2BCB496725F}" destId="{8415D8C8-36C5-6044-BB1D-9FC1A628B0EC}" srcOrd="0" destOrd="0" parTransId="{AC2E504E-0923-D44B-ABCD-70607D794270}" sibTransId="{D8C7C9FF-1AF0-FA45-9CA3-07D54C918F56}"/>
-    <dgm:cxn modelId="{740AB78C-EFB5-8E4F-9943-46265A83F0F8}" type="presOf" srcId="{372A6B95-D9E5-6249-B2F0-0DE6F6192180}" destId="{0C3F763D-8E11-F34D-810D-888D3FC54C11}" srcOrd="0" destOrd="0" presId="urn:microsoft.com/office/officeart/2005/8/layout/hierarchy3"/>
-    <dgm:cxn modelId="{42695AED-DA5F-6245-914E-9289C0DDF05C}" type="presOf" srcId="{D832FB61-F5A1-744B-B77F-8B55494B5920}" destId="{963A8818-EFB5-2045-8E97-06864C5E1E48}" srcOrd="0" destOrd="0" presId="urn:microsoft.com/office/officeart/2005/8/layout/hierarchy3"/>
-    <dgm:cxn modelId="{4E06CB71-F129-E640-9945-FDDCE7AF9C05}" type="presOf" srcId="{2C7F63FC-6D48-F241-BE8F-7796AA3A8831}" destId="{E91D6E98-4A8A-7D4B-831B-515ED221AB5A}" srcOrd="0" destOrd="0" presId="urn:microsoft.com/office/officeart/2005/8/layout/hierarchy3"/>
-    <dgm:cxn modelId="{0614B6E3-4F51-874C-8185-028725A657EA}" type="presOf" srcId="{0A4FAA92-892E-DF40-B8E5-6552AA3219AB}" destId="{0EE01224-0C37-4A44-A80B-7346B2402C9A}" srcOrd="1" destOrd="0" presId="urn:microsoft.com/office/officeart/2005/8/layout/hierarchy3"/>
-    <dgm:cxn modelId="{51A87FD3-AD17-E344-A98D-8814078158B2}" type="presOf" srcId="{1D7CD905-2134-6941-A180-A2BCB496725F}" destId="{38FA3025-FC70-C34F-BD6C-B2BD59D87B83}" srcOrd="0" destOrd="0" presId="urn:microsoft.com/office/officeart/2005/8/layout/hierarchy3"/>
-    <dgm:cxn modelId="{6CD6AAAF-A8E8-E345-B33F-05CDE049A4E4}" type="presOf" srcId="{B7CEE7F7-D996-E649-BBF4-D184B1373D29}" destId="{53E2407D-CFE3-8647-98CE-0D339859E4F2}" srcOrd="0" destOrd="0" presId="urn:microsoft.com/office/officeart/2005/8/layout/hierarchy3"/>
-    <dgm:cxn modelId="{0C9269B9-013A-F844-B7A9-27B07E7A6F10}" srcId="{1D7CD905-2134-6941-A180-A2BCB496725F}" destId="{282EB197-92B1-0F4D-A132-91EB58EF79F8}" srcOrd="1" destOrd="0" parTransId="{372A6B95-D9E5-6249-B2F0-0DE6F6192180}" sibTransId="{B48D90CA-52AB-DD49-AD09-C1C4B352D655}"/>
-    <dgm:cxn modelId="{0F13D986-AF0C-C447-BF2F-A66201A3E499}" type="presOf" srcId="{62872CB7-6208-5940-B7FF-EEC60552E903}" destId="{4195EDD7-3FC5-C849-90D8-9A4C827BEF82}" srcOrd="0" destOrd="0" presId="urn:microsoft.com/office/officeart/2005/8/layout/hierarchy3"/>
     <dgm:cxn modelId="{FA52AC4A-8EF2-764C-A31C-8ADA07FEFB49}" type="presOf" srcId="{6F176830-7940-A84B-8A6C-398B6601EB2F}" destId="{DB2F40E0-9FD7-624D-950A-542C717B0F6C}" srcOrd="0" destOrd="0" presId="urn:microsoft.com/office/officeart/2005/8/layout/hierarchy3"/>
-    <dgm:cxn modelId="{3B11B0F1-73DF-4841-B3D2-4024C7F6C01F}" srcId="{1D7CD905-2134-6941-A180-A2BCB496725F}" destId="{62872CB7-6208-5940-B7FF-EEC60552E903}" srcOrd="2" destOrd="0" parTransId="{AF2337E9-20E5-D34E-B312-1E09EE352563}" sibTransId="{F3CF04AF-1DB4-524D-B29D-8C1B96295F2E}"/>
     <dgm:cxn modelId="{149D6335-1278-7D45-871B-2F28E75947CD}" type="presOf" srcId="{80F0DC80-F3BF-BC48-9A45-9EB31247C651}" destId="{33C83B67-DA71-114F-850F-75BF3F425167}" srcOrd="0" destOrd="0" presId="urn:microsoft.com/office/officeart/2005/8/layout/hierarchy3"/>
-    <dgm:cxn modelId="{97B904FC-B1EC-1E4D-98BC-8B472ACDED1A}" type="presOf" srcId="{282EB197-92B1-0F4D-A132-91EB58EF79F8}" destId="{94E73A5D-50EB-DF44-A6CB-2FC0FE1DB175}" srcOrd="0" destOrd="0" presId="urn:microsoft.com/office/officeart/2005/8/layout/hierarchy3"/>
-    <dgm:cxn modelId="{0B67654B-DFDB-4F43-A320-D13497D59663}" type="presOf" srcId="{EE7ED4A5-36A2-D342-9D65-825850484F33}" destId="{5C2F9454-BA97-AE44-8FE8-AD4764E0C8E4}" srcOrd="0" destOrd="0" presId="urn:microsoft.com/office/officeart/2005/8/layout/hierarchy3"/>
-    <dgm:cxn modelId="{89A1AAAF-5E26-3E47-BD2C-3F13D58F7940}" type="presOf" srcId="{091B6FCD-29FB-0E4D-9D26-986120DFA0DD}" destId="{586242FA-5624-2C40-9C92-DF6EFC47163A}" srcOrd="0" destOrd="0" presId="urn:microsoft.com/office/officeart/2005/8/layout/hierarchy3"/>
-    <dgm:cxn modelId="{D02BC8DA-B75F-5D44-BC82-904A971FD5C1}" type="presOf" srcId="{8415D8C8-36C5-6044-BB1D-9FC1A628B0EC}" destId="{12DA5909-ADFB-2A40-A699-E7E8B523FCEB}" srcOrd="0" destOrd="0" presId="urn:microsoft.com/office/officeart/2005/8/layout/hierarchy3"/>
     <dgm:cxn modelId="{7C521AAB-E10E-F14C-90B5-1C0FEE6C0177}" type="presParOf" srcId="{5C2F9454-BA97-AE44-8FE8-AD4764E0C8E4}" destId="{75223CAA-7D95-994F-B73B-F70557FE184F}" srcOrd="0" destOrd="0" presId="urn:microsoft.com/office/officeart/2005/8/layout/hierarchy3"/>
     <dgm:cxn modelId="{2CC4BAA5-38DC-5A42-8157-F5279F184768}" type="presParOf" srcId="{75223CAA-7D95-994F-B73B-F70557FE184F}" destId="{5892D45F-8B2E-224B-8474-05EDD094B1B5}" srcOrd="0" destOrd="0" presId="urn:microsoft.com/office/officeart/2005/8/layout/hierarchy3"/>
     <dgm:cxn modelId="{8DFBBF91-23DA-5944-AC98-16548441B9D7}" type="presParOf" srcId="{5892D45F-8B2E-224B-8474-05EDD094B1B5}" destId="{38FA3025-FC70-C34F-BD6C-B2BD59D87B83}" srcOrd="0" destOrd="0" presId="urn:microsoft.com/office/officeart/2005/8/layout/hierarchy3"/>
@@ -3186,7 +3284,7 @@
   <dgm:whole/>
   <dgm:extLst>
     <a:ext uri="http://schemas.microsoft.com/office/drawing/2008/diagram">
-      <dsp:dataModelExt xmlns:dsp="http://schemas.microsoft.com/office/drawing/2008/diagram" relId="rId6" minVer="http://schemas.openxmlformats.org/drawingml/2006/diagram"/>
+      <dsp:dataModelExt xmlns:dsp="http://schemas.microsoft.com/office/drawing/2008/diagram" relId="rId7" minVer="http://schemas.openxmlformats.org/drawingml/2006/diagram"/>
     </a:ext>
   </dgm:extLst>
 </dgm:dataModel>
@@ -3377,6 +3475,13 @@
         </dgm:presLayoutVars>
       </dgm:prSet>
       <dgm:spPr/>
+      <dgm:t>
+        <a:bodyPr/>
+        <a:lstStyle/>
+        <a:p>
+          <a:endParaRPr lang="en-US"/>
+        </a:p>
+      </dgm:t>
     </dgm:pt>
     <dgm:pt modelId="{576B6128-EA6F-C04F-9DF1-2277389C6FAC}" type="pres">
       <dgm:prSet presAssocID="{1F61C664-3B7A-824D-AB48-1BCB0919C48F}" presName="arrow" presStyleLbl="bgShp" presStyleIdx="0" presStyleCnt="1" custScaleX="114489" custLinFactNeighborX="1579" custLinFactNeighborY="11049"/>
@@ -3397,6 +3502,13 @@
         </dgm:presLayoutVars>
       </dgm:prSet>
       <dgm:spPr/>
+      <dgm:t>
+        <a:bodyPr/>
+        <a:lstStyle/>
+        <a:p>
+          <a:endParaRPr lang="en-US"/>
+        </a:p>
+      </dgm:t>
     </dgm:pt>
     <dgm:pt modelId="{2EF22FAA-E2A9-5C44-A64E-76BA4D3950F6}" type="pres">
       <dgm:prSet presAssocID="{BDBEFEF8-4E8C-7A43-848F-A80A8CD9CC7C}" presName="sibTrans" presStyleCnt="0"/>
@@ -3438,13 +3550,13 @@
     </dgm:pt>
   </dgm:ptLst>
   <dgm:cxnLst>
+    <dgm:cxn modelId="{10FB75A7-DFA2-DD44-92FB-163077EB9D1F}" type="presOf" srcId="{635E2915-E405-AA4F-8302-EC1DD57D78FF}" destId="{E361D679-8A40-2D4F-90FF-881611B06987}" srcOrd="0" destOrd="0" presId="urn:microsoft.com/office/officeart/2005/8/layout/hProcess9"/>
+    <dgm:cxn modelId="{82AAAD59-E8EE-8E4A-8A48-4A4FAFFC8753}" type="presOf" srcId="{EE94E670-EC61-F74A-B749-8A1F690C7697}" destId="{4516450C-47B1-5C4D-8DC4-B81D7B9B533D}" srcOrd="0" destOrd="0" presId="urn:microsoft.com/office/officeart/2005/8/layout/hProcess9"/>
+    <dgm:cxn modelId="{5A5A2370-6143-CC4C-9EC1-6D3F5E74EC3D}" type="presOf" srcId="{1324B868-3F0C-FC49-98B5-080D554D4A84}" destId="{88CBABAD-981F-2E4F-BD8C-AB4FB6AB8947}" srcOrd="0" destOrd="0" presId="urn:microsoft.com/office/officeart/2005/8/layout/hProcess9"/>
+    <dgm:cxn modelId="{149E1830-A5E0-6648-832A-F5A58E6542DC}" srcId="{1F61C664-3B7A-824D-AB48-1BCB0919C48F}" destId="{635E2915-E405-AA4F-8302-EC1DD57D78FF}" srcOrd="1" destOrd="0" parTransId="{D71B8E2A-1044-D849-9BA3-C356204E4E7C}" sibTransId="{8908B196-5257-5C41-A9AE-208A0EFF0FFF}"/>
     <dgm:cxn modelId="{81F9A04A-34BB-E14C-A73D-C8547B5F1611}" type="presOf" srcId="{1F61C664-3B7A-824D-AB48-1BCB0919C48F}" destId="{65D7B998-B765-EF4C-B756-93AAD0FC5B60}" srcOrd="0" destOrd="0" presId="urn:microsoft.com/office/officeart/2005/8/layout/hProcess9"/>
-    <dgm:cxn modelId="{82AAAD59-E8EE-8E4A-8A48-4A4FAFFC8753}" type="presOf" srcId="{EE94E670-EC61-F74A-B749-8A1F690C7697}" destId="{4516450C-47B1-5C4D-8DC4-B81D7B9B533D}" srcOrd="0" destOrd="0" presId="urn:microsoft.com/office/officeart/2005/8/layout/hProcess9"/>
+    <dgm:cxn modelId="{871B08A3-AE54-2D43-8D05-EA6C514F23A6}" srcId="{1F61C664-3B7A-824D-AB48-1BCB0919C48F}" destId="{EE94E670-EC61-F74A-B749-8A1F690C7697}" srcOrd="2" destOrd="0" parTransId="{9A8B380B-D8B2-4243-B32F-67C9124085AA}" sibTransId="{30320AE0-E6B8-E344-8B6D-DCF6898FE6FB}"/>
     <dgm:cxn modelId="{17D6F650-9FDC-1940-8EF7-FBA2C83F9A5E}" srcId="{1F61C664-3B7A-824D-AB48-1BCB0919C48F}" destId="{1324B868-3F0C-FC49-98B5-080D554D4A84}" srcOrd="0" destOrd="0" parTransId="{F5C9486B-1449-C546-B14A-86AB4E975A66}" sibTransId="{BDBEFEF8-4E8C-7A43-848F-A80A8CD9CC7C}"/>
-    <dgm:cxn modelId="{5A5A2370-6143-CC4C-9EC1-6D3F5E74EC3D}" type="presOf" srcId="{1324B868-3F0C-FC49-98B5-080D554D4A84}" destId="{88CBABAD-981F-2E4F-BD8C-AB4FB6AB8947}" srcOrd="0" destOrd="0" presId="urn:microsoft.com/office/officeart/2005/8/layout/hProcess9"/>
-    <dgm:cxn modelId="{10FB75A7-DFA2-DD44-92FB-163077EB9D1F}" type="presOf" srcId="{635E2915-E405-AA4F-8302-EC1DD57D78FF}" destId="{E361D679-8A40-2D4F-90FF-881611B06987}" srcOrd="0" destOrd="0" presId="urn:microsoft.com/office/officeart/2005/8/layout/hProcess9"/>
-    <dgm:cxn modelId="{871B08A3-AE54-2D43-8D05-EA6C514F23A6}" srcId="{1F61C664-3B7A-824D-AB48-1BCB0919C48F}" destId="{EE94E670-EC61-F74A-B749-8A1F690C7697}" srcOrd="2" destOrd="0" parTransId="{9A8B380B-D8B2-4243-B32F-67C9124085AA}" sibTransId="{30320AE0-E6B8-E344-8B6D-DCF6898FE6FB}"/>
-    <dgm:cxn modelId="{149E1830-A5E0-6648-832A-F5A58E6542DC}" srcId="{1F61C664-3B7A-824D-AB48-1BCB0919C48F}" destId="{635E2915-E405-AA4F-8302-EC1DD57D78FF}" srcOrd="1" destOrd="0" parTransId="{D71B8E2A-1044-D849-9BA3-C356204E4E7C}" sibTransId="{8908B196-5257-5C41-A9AE-208A0EFF0FFF}"/>
     <dgm:cxn modelId="{BB2B814A-3279-0A42-88CF-0ED82B6547BC}" type="presParOf" srcId="{65D7B998-B765-EF4C-B756-93AAD0FC5B60}" destId="{576B6128-EA6F-C04F-9DF1-2277389C6FAC}" srcOrd="0" destOrd="0" presId="urn:microsoft.com/office/officeart/2005/8/layout/hProcess9"/>
     <dgm:cxn modelId="{6990A095-D10A-1A47-A90D-D1019AD5F161}" type="presParOf" srcId="{65D7B998-B765-EF4C-B756-93AAD0FC5B60}" destId="{350ACCB0-2616-D642-A9ED-0633548EA70D}" srcOrd="1" destOrd="0" presId="urn:microsoft.com/office/officeart/2005/8/layout/hProcess9"/>
     <dgm:cxn modelId="{698DA9C9-C032-5D4A-8994-12BF901408EC}" type="presParOf" srcId="{350ACCB0-2616-D642-A9ED-0633548EA70D}" destId="{88CBABAD-981F-2E4F-BD8C-AB4FB6AB8947}" srcOrd="0" destOrd="0" presId="urn:microsoft.com/office/officeart/2005/8/layout/hProcess9"/>
@@ -3679,6 +3791,13 @@
         </dgm:presLayoutVars>
       </dgm:prSet>
       <dgm:spPr/>
+      <dgm:t>
+        <a:bodyPr/>
+        <a:lstStyle/>
+        <a:p>
+          <a:endParaRPr lang="en-US"/>
+        </a:p>
+      </dgm:t>
     </dgm:pt>
     <dgm:pt modelId="{576B6128-EA6F-C04F-9DF1-2277389C6FAC}" type="pres">
       <dgm:prSet presAssocID="{1F61C664-3B7A-824D-AB48-1BCB0919C48F}" presName="arrow" presStyleLbl="bgShp" presStyleIdx="0" presStyleCnt="1" custScaleX="114489" custLinFactNeighborX="1579" custLinFactNeighborY="11049"/>
@@ -9975,7 +10094,7 @@
           <a:p>
             <a:fld id="{563F7F9A-8ED5-604A-B237-BB23FBCA83E6}" type="datetimeFigureOut">
               <a:rPr lang="en-US" smtClean="0"/>
-              <a:t>5/11/15</a:t>
+              <a:t>05/11/15</a:t>
             </a:fld>
             <a:endParaRPr lang="en-US"/>
           </a:p>
@@ -10299,7 +10418,17 @@
           <a:p>
             <a:r>
               <a:rPr lang="en-US" baseline="0" dirty="0" smtClean="0"/>
-              <a:t>Order of names?</a:t>
+              <a:t>Order of names</a:t>
+            </a:r>
+            <a:r>
+              <a:rPr lang="en-US" baseline="0" dirty="0" smtClean="0"/>
+              <a:t>?</a:t>
+            </a:r>
+          </a:p>
+          <a:p>
+            <a:r>
+              <a:rPr lang="en-US" baseline="0" dirty="0" smtClean="0"/>
+              <a:t>Highlight name</a:t>
             </a:r>
             <a:endParaRPr lang="en-US" dirty="0"/>
           </a:p>
@@ -10438,6 +10567,282 @@
     <p:extLst>
       <p:ext uri="{BB962C8B-B14F-4D97-AF65-F5344CB8AC3E}">
         <p14:creationId xmlns:p14="http://schemas.microsoft.com/office/powerpoint/2010/main" val="689828794"/>
+      </p:ext>
+    </p:extLst>
+  </p:cSld>
+  <p:clrMapOvr>
+    <a:masterClrMapping/>
+  </p:clrMapOvr>
+</p:notes>
+</file>
+
+<file path=ppt/notesSlides/notesSlide3.xml><?xml version="1.0" encoding="utf-8"?>
+<p:notes xmlns:a="http://schemas.openxmlformats.org/drawingml/2006/main" xmlns:r="http://schemas.openxmlformats.org/officeDocument/2006/relationships" xmlns:p="http://schemas.openxmlformats.org/presentationml/2006/main">
+  <p:cSld>
+    <p:spTree>
+      <p:nvGrpSpPr>
+        <p:cNvPr id="1" name=""/>
+        <p:cNvGrpSpPr/>
+        <p:nvPr/>
+      </p:nvGrpSpPr>
+      <p:grpSpPr>
+        <a:xfrm>
+          <a:off x="0" y="0"/>
+          <a:ext cx="0" cy="0"/>
+          <a:chOff x="0" y="0"/>
+          <a:chExt cx="0" cy="0"/>
+        </a:xfrm>
+      </p:grpSpPr>
+      <p:sp>
+        <p:nvSpPr>
+          <p:cNvPr id="2" name="Slide Image Placeholder 1"/>
+          <p:cNvSpPr>
+            <a:spLocks noGrp="1" noRot="1" noChangeAspect="1"/>
+          </p:cNvSpPr>
+          <p:nvPr>
+            <p:ph type="sldImg"/>
+          </p:nvPr>
+        </p:nvSpPr>
+        <p:spPr/>
+      </p:sp>
+      <p:sp>
+        <p:nvSpPr>
+          <p:cNvPr id="3" name="Notes Placeholder 2"/>
+          <p:cNvSpPr>
+            <a:spLocks noGrp="1"/>
+          </p:cNvSpPr>
+          <p:nvPr>
+            <p:ph type="body" idx="1"/>
+          </p:nvPr>
+        </p:nvSpPr>
+        <p:spPr/>
+        <p:txBody>
+          <a:bodyPr/>
+          <a:lstStyle/>
+          <a:p>
+            <a:r>
+              <a:rPr lang="en-US" dirty="0" smtClean="0"/>
+              <a:t>Maybe</a:t>
+            </a:r>
+            <a:r>
+              <a:rPr lang="en-US" baseline="0" dirty="0" smtClean="0"/>
+              <a:t> put before spaced seeds.. Maybe put example with captioning</a:t>
+            </a:r>
+            <a:endParaRPr lang="en-US" dirty="0"/>
+          </a:p>
+        </p:txBody>
+      </p:sp>
+      <p:sp>
+        <p:nvSpPr>
+          <p:cNvPr id="4" name="Slide Number Placeholder 3"/>
+          <p:cNvSpPr>
+            <a:spLocks noGrp="1"/>
+          </p:cNvSpPr>
+          <p:nvPr>
+            <p:ph type="sldNum" sz="quarter" idx="10"/>
+          </p:nvPr>
+        </p:nvSpPr>
+        <p:spPr/>
+        <p:txBody>
+          <a:bodyPr/>
+          <a:lstStyle/>
+          <a:p>
+            <a:fld id="{1629F707-43C7-6445-B959-0A5E64C5849C}" type="slidenum">
+              <a:rPr lang="en-US" smtClean="0"/>
+              <a:t>3</a:t>
+            </a:fld>
+            <a:endParaRPr lang="en-US"/>
+          </a:p>
+        </p:txBody>
+      </p:sp>
+    </p:spTree>
+    <p:extLst>
+      <p:ext uri="{BB962C8B-B14F-4D97-AF65-F5344CB8AC3E}">
+        <p14:creationId xmlns:p14="http://schemas.microsoft.com/office/powerpoint/2010/main" val="1664217111"/>
+      </p:ext>
+    </p:extLst>
+  </p:cSld>
+  <p:clrMapOvr>
+    <a:masterClrMapping/>
+  </p:clrMapOvr>
+</p:notes>
+</file>
+
+<file path=ppt/notesSlides/notesSlide4.xml><?xml version="1.0" encoding="utf-8"?>
+<p:notes xmlns:a="http://schemas.openxmlformats.org/drawingml/2006/main" xmlns:r="http://schemas.openxmlformats.org/officeDocument/2006/relationships" xmlns:p="http://schemas.openxmlformats.org/presentationml/2006/main">
+  <p:cSld>
+    <p:spTree>
+      <p:nvGrpSpPr>
+        <p:cNvPr id="1" name=""/>
+        <p:cNvGrpSpPr/>
+        <p:nvPr/>
+      </p:nvGrpSpPr>
+      <p:grpSpPr>
+        <a:xfrm>
+          <a:off x="0" y="0"/>
+          <a:ext cx="0" cy="0"/>
+          <a:chOff x="0" y="0"/>
+          <a:chExt cx="0" cy="0"/>
+        </a:xfrm>
+      </p:grpSpPr>
+      <p:sp>
+        <p:nvSpPr>
+          <p:cNvPr id="2" name="Slide Image Placeholder 1"/>
+          <p:cNvSpPr>
+            <a:spLocks noGrp="1" noRot="1" noChangeAspect="1"/>
+          </p:cNvSpPr>
+          <p:nvPr>
+            <p:ph type="sldImg"/>
+          </p:nvPr>
+        </p:nvSpPr>
+        <p:spPr/>
+      </p:sp>
+      <p:sp>
+        <p:nvSpPr>
+          <p:cNvPr id="3" name="Notes Placeholder 2"/>
+          <p:cNvSpPr>
+            <a:spLocks noGrp="1"/>
+          </p:cNvSpPr>
+          <p:nvPr>
+            <p:ph type="body" idx="1"/>
+          </p:nvPr>
+        </p:nvSpPr>
+        <p:spPr/>
+        <p:txBody>
+          <a:bodyPr/>
+          <a:lstStyle/>
+          <a:p>
+            <a:r>
+              <a:rPr lang="en-US" dirty="0" smtClean="0"/>
+              <a:t>Working </a:t>
+            </a:r>
+            <a:r>
+              <a:rPr lang="en-US" dirty="0" err="1" smtClean="0"/>
+              <a:t>defn</a:t>
+            </a:r>
+            <a:r>
+              <a:rPr lang="en-US" dirty="0" smtClean="0"/>
+              <a:t> trying to use</a:t>
+            </a:r>
+            <a:endParaRPr lang="en-US" dirty="0"/>
+          </a:p>
+        </p:txBody>
+      </p:sp>
+      <p:sp>
+        <p:nvSpPr>
+          <p:cNvPr id="4" name="Slide Number Placeholder 3"/>
+          <p:cNvSpPr>
+            <a:spLocks noGrp="1"/>
+          </p:cNvSpPr>
+          <p:nvPr>
+            <p:ph type="sldNum" sz="quarter" idx="10"/>
+          </p:nvPr>
+        </p:nvSpPr>
+        <p:spPr/>
+        <p:txBody>
+          <a:bodyPr/>
+          <a:lstStyle/>
+          <a:p>
+            <a:fld id="{1629F707-43C7-6445-B959-0A5E64C5849C}" type="slidenum">
+              <a:rPr lang="en-US" smtClean="0"/>
+              <a:t>4</a:t>
+            </a:fld>
+            <a:endParaRPr lang="en-US"/>
+          </a:p>
+        </p:txBody>
+      </p:sp>
+    </p:spTree>
+    <p:extLst>
+      <p:ext uri="{BB962C8B-B14F-4D97-AF65-F5344CB8AC3E}">
+        <p14:creationId xmlns:p14="http://schemas.microsoft.com/office/powerpoint/2010/main" val="2213434331"/>
+      </p:ext>
+    </p:extLst>
+  </p:cSld>
+  <p:clrMapOvr>
+    <a:masterClrMapping/>
+  </p:clrMapOvr>
+</p:notes>
+</file>
+
+<file path=ppt/notesSlides/notesSlide5.xml><?xml version="1.0" encoding="utf-8"?>
+<p:notes xmlns:a="http://schemas.openxmlformats.org/drawingml/2006/main" xmlns:r="http://schemas.openxmlformats.org/officeDocument/2006/relationships" xmlns:p="http://schemas.openxmlformats.org/presentationml/2006/main">
+  <p:cSld>
+    <p:spTree>
+      <p:nvGrpSpPr>
+        <p:cNvPr id="1" name=""/>
+        <p:cNvGrpSpPr/>
+        <p:nvPr/>
+      </p:nvGrpSpPr>
+      <p:grpSpPr>
+        <a:xfrm>
+          <a:off x="0" y="0"/>
+          <a:ext cx="0" cy="0"/>
+          <a:chOff x="0" y="0"/>
+          <a:chExt cx="0" cy="0"/>
+        </a:xfrm>
+      </p:grpSpPr>
+      <p:sp>
+        <p:nvSpPr>
+          <p:cNvPr id="2" name="Slide Image Placeholder 1"/>
+          <p:cNvSpPr>
+            <a:spLocks noGrp="1" noRot="1" noChangeAspect="1"/>
+          </p:cNvSpPr>
+          <p:nvPr>
+            <p:ph type="sldImg"/>
+          </p:nvPr>
+        </p:nvSpPr>
+        <p:spPr/>
+      </p:sp>
+      <p:sp>
+        <p:nvSpPr>
+          <p:cNvPr id="3" name="Notes Placeholder 2"/>
+          <p:cNvSpPr>
+            <a:spLocks noGrp="1"/>
+          </p:cNvSpPr>
+          <p:nvPr>
+            <p:ph type="body" idx="1"/>
+          </p:nvPr>
+        </p:nvSpPr>
+        <p:spPr/>
+        <p:txBody>
+          <a:bodyPr/>
+          <a:lstStyle/>
+          <a:p>
+            <a:r>
+              <a:rPr lang="en-US" dirty="0" smtClean="0"/>
+              <a:t>Might be too detailed</a:t>
+            </a:r>
+            <a:endParaRPr lang="en-US" dirty="0"/>
+          </a:p>
+        </p:txBody>
+      </p:sp>
+      <p:sp>
+        <p:nvSpPr>
+          <p:cNvPr id="4" name="Slide Number Placeholder 3"/>
+          <p:cNvSpPr>
+            <a:spLocks noGrp="1"/>
+          </p:cNvSpPr>
+          <p:nvPr>
+            <p:ph type="sldNum" sz="quarter" idx="10"/>
+          </p:nvPr>
+        </p:nvSpPr>
+        <p:spPr/>
+        <p:txBody>
+          <a:bodyPr/>
+          <a:lstStyle/>
+          <a:p>
+            <a:fld id="{1629F707-43C7-6445-B959-0A5E64C5849C}" type="slidenum">
+              <a:rPr lang="en-US" smtClean="0"/>
+              <a:t>5</a:t>
+            </a:fld>
+            <a:endParaRPr lang="en-US"/>
+          </a:p>
+        </p:txBody>
+      </p:sp>
+    </p:spTree>
+    <p:extLst>
+      <p:ext uri="{BB962C8B-B14F-4D97-AF65-F5344CB8AC3E}">
+        <p14:creationId xmlns:p14="http://schemas.microsoft.com/office/powerpoint/2010/main" val="3968561857"/>
       </p:ext>
     </p:extLst>
   </p:cSld>
@@ -10700,7 +11105,7 @@
           <a:p>
             <a:fld id="{41662A20-3E31-1641-AE5F-84D5BA1BB0BF}" type="datetimeFigureOut">
               <a:rPr lang="en-US" smtClean="0"/>
-              <a:t>5/11/15</a:t>
+              <a:t>05/11/15</a:t>
             </a:fld>
             <a:endParaRPr lang="en-US"/>
           </a:p>
@@ -10913,7 +11318,7 @@
           <a:p>
             <a:fld id="{41662A20-3E31-1641-AE5F-84D5BA1BB0BF}" type="datetimeFigureOut">
               <a:rPr lang="en-US" smtClean="0"/>
-              <a:t>5/11/15</a:t>
+              <a:t>05/11/15</a:t>
             </a:fld>
             <a:endParaRPr lang="en-US"/>
           </a:p>
@@ -11180,7 +11585,7 @@
           <a:p>
             <a:fld id="{41662A20-3E31-1641-AE5F-84D5BA1BB0BF}" type="datetimeFigureOut">
               <a:rPr lang="en-US" smtClean="0"/>
-              <a:t>5/11/15</a:t>
+              <a:t>05/11/15</a:t>
             </a:fld>
             <a:endParaRPr lang="en-US"/>
           </a:p>
@@ -11330,7 +11735,7 @@
           <a:p>
             <a:fld id="{41662A20-3E31-1641-AE5F-84D5BA1BB0BF}" type="datetimeFigureOut">
               <a:rPr lang="en-US" smtClean="0"/>
-              <a:t>5/11/15</a:t>
+              <a:t>05/11/15</a:t>
             </a:fld>
             <a:endParaRPr lang="en-US"/>
           </a:p>
@@ -11660,7 +12065,7 @@
           <a:p>
             <a:fld id="{41662A20-3E31-1641-AE5F-84D5BA1BB0BF}" type="datetimeFigureOut">
               <a:rPr lang="en-US" smtClean="0"/>
-              <a:t>5/11/15</a:t>
+              <a:t>05/11/15</a:t>
             </a:fld>
             <a:endParaRPr lang="en-US"/>
           </a:p>
@@ -11968,7 +12373,7 @@
           <a:p>
             <a:fld id="{41662A20-3E31-1641-AE5F-84D5BA1BB0BF}" type="datetimeFigureOut">
               <a:rPr lang="en-US" smtClean="0"/>
-              <a:t>5/11/15</a:t>
+              <a:t>05/11/15</a:t>
             </a:fld>
             <a:endParaRPr lang="en-US"/>
           </a:p>
@@ -12389,7 +12794,7 @@
           <a:p>
             <a:fld id="{41662A20-3E31-1641-AE5F-84D5BA1BB0BF}" type="datetimeFigureOut">
               <a:rPr lang="en-US" smtClean="0"/>
-              <a:t>5/11/15</a:t>
+              <a:t>05/11/15</a:t>
             </a:fld>
             <a:endParaRPr lang="en-US"/>
           </a:p>
@@ -12502,7 +12907,7 @@
           <a:p>
             <a:fld id="{41662A20-3E31-1641-AE5F-84D5BA1BB0BF}" type="datetimeFigureOut">
               <a:rPr lang="en-US" smtClean="0"/>
-              <a:t>5/11/15</a:t>
+              <a:t>05/11/15</a:t>
             </a:fld>
             <a:endParaRPr lang="en-US"/>
           </a:p>
@@ -12661,7 +13066,7 @@
           <a:p>
             <a:fld id="{41662A20-3E31-1641-AE5F-84D5BA1BB0BF}" type="datetimeFigureOut">
               <a:rPr lang="en-US" smtClean="0"/>
-              <a:t>5/11/15</a:t>
+              <a:t>05/11/15</a:t>
             </a:fld>
             <a:endParaRPr lang="en-US"/>
           </a:p>
@@ -13045,7 +13450,7 @@
           <a:p>
             <a:fld id="{41662A20-3E31-1641-AE5F-84D5BA1BB0BF}" type="datetimeFigureOut">
               <a:rPr lang="en-US" smtClean="0"/>
-              <a:t>5/11/15</a:t>
+              <a:t>05/11/15</a:t>
             </a:fld>
             <a:endParaRPr lang="en-US"/>
           </a:p>
@@ -13407,7 +13812,7 @@
           <a:p>
             <a:fld id="{41662A20-3E31-1641-AE5F-84D5BA1BB0BF}" type="datetimeFigureOut">
               <a:rPr lang="en-US" smtClean="0"/>
-              <a:t>5/11/15</a:t>
+              <a:t>05/11/15</a:t>
             </a:fld>
             <a:endParaRPr lang="en-US"/>
           </a:p>
@@ -13741,7 +14146,7 @@
           <a:p>
             <a:fld id="{41662A20-3E31-1641-AE5F-84D5BA1BB0BF}" type="datetimeFigureOut">
               <a:rPr lang="en-US" smtClean="0"/>
-              <a:t>5/11/15</a:t>
+              <a:t>05/11/15</a:t>
             </a:fld>
             <a:endParaRPr lang="en-US"/>
           </a:p>
@@ -14560,11 +14965,7 @@
             </a:r>
             <a:r>
               <a:rPr lang="en-US" sz="2400" dirty="0" smtClean="0"/>
-              <a:t>each matching </a:t>
-            </a:r>
-            <a:r>
-              <a:rPr lang="en-US" sz="2400" dirty="0" smtClean="0"/>
-              <a:t>position </a:t>
+              <a:t>each matching position </a:t>
             </a:r>
             <a:r>
               <a:rPr lang="en-US" sz="2400" i="1" dirty="0" smtClean="0"/>
@@ -16590,27 +16991,15 @@
             </a:r>
             <a:r>
               <a:rPr lang="en-US" dirty="0" smtClean="0"/>
-              <a:t>an elementary repeat is a s</a:t>
+              <a:t>an elementary repeat is a subsequence </a:t>
+            </a:r>
+            <a:r>
+              <a:rPr lang="en-US" i="1" dirty="0" smtClean="0"/>
+              <a:t>A </a:t>
             </a:r>
             <a:r>
               <a:rPr lang="en-US" dirty="0" smtClean="0"/>
-              <a:t>ubsequence </a:t>
-            </a:r>
-            <a:r>
-              <a:rPr lang="en-US" i="1" dirty="0" smtClean="0"/>
-              <a:t>A</a:t>
-            </a:r>
-            <a:r>
-              <a:rPr lang="en-US" i="1" dirty="0" smtClean="0"/>
-              <a:t> </a:t>
-            </a:r>
-            <a:r>
-              <a:rPr lang="en-US" dirty="0" smtClean="0"/>
-              <a:t>such that</a:t>
-            </a:r>
-            <a:r>
-              <a:rPr lang="en-US" dirty="0" smtClean="0"/>
-              <a:t>:</a:t>
+              <a:t>such that:</a:t>
             </a:r>
           </a:p>
           <a:p>
@@ -16642,11 +17031,6 @@
               </a:rPr>
               <a:t>l</a:t>
             </a:r>
-            <a:endParaRPr lang="en-US" i="1" dirty="0" smtClean="0">
-              <a:solidFill>
-                <a:srgbClr val="333333"/>
-              </a:solidFill>
-            </a:endParaRPr>
           </a:p>
           <a:p>
             <a:pPr marL="731520" lvl="1" indent="-457200">
@@ -16697,11 +17081,7 @@
             </a:r>
             <a:r>
               <a:rPr lang="en-US" dirty="0" smtClean="0"/>
-              <a:t>contains no </a:t>
-            </a:r>
-            <a:r>
-              <a:rPr lang="en-US" dirty="0" smtClean="0"/>
-              <a:t>subsequence </a:t>
+              <a:t>contains no subsequence </a:t>
             </a:r>
             <a:r>
               <a:rPr lang="en-US" b="1" i="1" dirty="0" smtClean="0"/>
@@ -17953,7 +18333,7 @@
         </p:xfrm>
         <a:graphic>
           <a:graphicData uri="http://schemas.openxmlformats.org/drawingml/2006/diagram">
-            <dgm:relIds xmlns:dgm="http://schemas.openxmlformats.org/drawingml/2006/diagram" xmlns:r="http://schemas.openxmlformats.org/officeDocument/2006/relationships" r:dm="rId2" r:lo="rId3" r:qs="rId4" r:cs="rId5"/>
+            <dgm:relIds xmlns:dgm="http://schemas.openxmlformats.org/drawingml/2006/diagram" xmlns:r="http://schemas.openxmlformats.org/officeDocument/2006/relationships" r:dm="rId3" r:lo="rId4" r:qs="rId5" r:cs="rId6"/>
           </a:graphicData>
         </a:graphic>
       </p:graphicFrame>
@@ -18162,27 +18542,15 @@
             </a:r>
             <a:r>
               <a:rPr lang="en-US" dirty="0" smtClean="0"/>
-              <a:t>, an elementary repeat is a s</a:t>
+              <a:t>, an elementary repeat is a subsequence </a:t>
+            </a:r>
+            <a:r>
+              <a:rPr lang="en-US" i="1" dirty="0" smtClean="0"/>
+              <a:t>A </a:t>
             </a:r>
             <a:r>
               <a:rPr lang="en-US" dirty="0" smtClean="0"/>
-              <a:t>ubsequence </a:t>
-            </a:r>
-            <a:r>
-              <a:rPr lang="en-US" i="1" dirty="0" smtClean="0"/>
-              <a:t>A</a:t>
-            </a:r>
-            <a:r>
-              <a:rPr lang="en-US" i="1" dirty="0" smtClean="0"/>
-              <a:t> </a:t>
-            </a:r>
-            <a:r>
-              <a:rPr lang="en-US" dirty="0" smtClean="0"/>
-              <a:t>such that</a:t>
-            </a:r>
-            <a:r>
-              <a:rPr lang="en-US" dirty="0" smtClean="0"/>
-              <a:t>:</a:t>
+              <a:t>such that:</a:t>
             </a:r>
           </a:p>
           <a:p>
@@ -18218,11 +18586,6 @@
               </a:rPr>
               <a:t>l</a:t>
             </a:r>
-            <a:endParaRPr lang="en-US" i="1" dirty="0" smtClean="0">
-              <a:solidFill>
-                <a:srgbClr val="990000"/>
-              </a:solidFill>
-            </a:endParaRPr>
           </a:p>
           <a:p>
             <a:pPr marL="731520" lvl="1" indent="-457200">
@@ -18270,11 +18633,7 @@
             </a:r>
             <a:r>
               <a:rPr lang="en-US" dirty="0" smtClean="0"/>
-              <a:t>contains no </a:t>
-            </a:r>
-            <a:r>
-              <a:rPr lang="en-US" dirty="0" smtClean="0"/>
-              <a:t>subsequence </a:t>
+              <a:t>contains no subsequence </a:t>
             </a:r>
             <a:r>
               <a:rPr lang="en-US" b="1" i="1" dirty="0" smtClean="0"/>
@@ -18373,11 +18732,7 @@
             </a:r>
             <a:r>
               <a:rPr lang="en-US" dirty="0" smtClean="0"/>
-              <a:t> </a:t>
-            </a:r>
-            <a:r>
-              <a:rPr lang="en-US" dirty="0" smtClean="0"/>
-              <a:t>i.e. is not contained within a larger elementary repeat</a:t>
+              <a:t> i.e. is not contained within a larger elementary repeat</a:t>
             </a:r>
             <a:endParaRPr lang="en-US" dirty="0"/>
           </a:p>

</xml_diff>